<commit_message>
more small fixes to sorting intro slides
</commit_message>
<xml_diff>
--- a/slides/sorting-intro-f21.pptx
+++ b/slides/sorting-intro-f21.pptx
@@ -5418,7 +5418,7 @@
               <a:rPr lang="en-US" altLang="en-US" dirty="0">
                 <a:ea typeface="ＭＳ Ｐゴシック" panose="020B0600070205080204" pitchFamily="34" charset="-128"/>
               </a:rPr>
-              <a:t>A[0..j-1] are the elements originally stored in the sub-list but in sorted order</a:t>
+              <a:t>A[1..j-1] are the elements originally stored in the sub-list but in sorted order</a:t>
             </a:r>
           </a:p>
         </p:txBody>
@@ -5810,7 +5810,7 @@
           <a:graphicData uri="http://schemas.openxmlformats.org/presentationml/2006/ole">
             <mc:AlternateContent xmlns:mc="http://schemas.openxmlformats.org/markup-compatibility/2006">
               <mc:Choice xmlns:v="urn:schemas-microsoft-com:vml" Requires="v">
-                <p:oleObj spid="_x0000_s6213" name="Equation" r:id="rId5" imgW="2286000" imgH="482600" progId="Equation.3">
+                <p:oleObj spid="_x0000_s6217" name="Equation" r:id="rId5" imgW="2286000" imgH="482600" progId="Equation.3">
                   <p:embed/>
                 </p:oleObj>
               </mc:Choice>
@@ -5893,7 +5893,7 @@
           <a:graphicData uri="http://schemas.openxmlformats.org/presentationml/2006/ole">
             <mc:AlternateContent xmlns:mc="http://schemas.openxmlformats.org/markup-compatibility/2006">
               <mc:Choice xmlns:v="urn:schemas-microsoft-com:vml" Requires="v">
-                <p:oleObj spid="_x0000_s6214" name="Equation" r:id="rId7" imgW="1663700" imgH="457200" progId="Equation.3">
+                <p:oleObj spid="_x0000_s6218" name="Equation" r:id="rId7" imgW="1663700" imgH="457200" progId="Equation.3">
                   <p:embed/>
                 </p:oleObj>
               </mc:Choice>
@@ -5976,7 +5976,7 @@
           <a:graphicData uri="http://schemas.openxmlformats.org/presentationml/2006/ole">
             <mc:AlternateContent xmlns:mc="http://schemas.openxmlformats.org/markup-compatibility/2006">
               <mc:Choice xmlns:v="urn:schemas-microsoft-com:vml" Requires="v">
-                <p:oleObj spid="_x0000_s6215" name="Equation" r:id="rId9" imgW="1130300" imgH="482600" progId="Equation.3">
+                <p:oleObj spid="_x0000_s6219" name="Equation" r:id="rId9" imgW="1130300" imgH="482600" progId="Equation.3">
                   <p:embed/>
                 </p:oleObj>
               </mc:Choice>
@@ -6089,7 +6089,7 @@
           <a:graphicData uri="http://schemas.openxmlformats.org/presentationml/2006/ole">
             <mc:AlternateContent xmlns:mc="http://schemas.openxmlformats.org/markup-compatibility/2006">
               <mc:Choice xmlns:v="urn:schemas-microsoft-com:vml" Requires="v">
-                <p:oleObj spid="_x0000_s6216" name="Equation" r:id="rId11" imgW="2819400" imgH="482600" progId="Equation.3">
+                <p:oleObj spid="_x0000_s6220" name="Equation" r:id="rId11" imgW="2819400" imgH="482600" progId="Equation.3">
                   <p:embed/>
                 </p:oleObj>
               </mc:Choice>
@@ -7692,7 +7692,7 @@
                 <a:ea typeface="Tahoma" panose="020B0604030504040204" pitchFamily="34" charset="0"/>
                 <a:cs typeface="Tahoma" panose="020B0604030504040204" pitchFamily="34" charset="0"/>
               </a:rPr>
-              <a:t> on smaller problems </a:t>
+              <a:t>() on smaller problems </a:t>
             </a:r>
             <a:br>
               <a:rPr lang="en-US" sz="2400" dirty="0">
@@ -7756,7 +7756,7 @@
           <a:p>
             <a:r>
               <a:rPr lang="en-US" dirty="0"/>
-              <a:t>Note:  maybe solve all the smaller problem, or maybe just some of them.</a:t>
+              <a:t>Note:  maybe solve all the smaller problems, or maybe just some of them.</a:t>
             </a:r>
           </a:p>
           <a:p>
@@ -9004,8 +9004,8 @@
           </a:p>
         </p:txBody>
       </p:sp>
-      <mc:AlternateContent xmlns:mc="http://schemas.openxmlformats.org/markup-compatibility/2006">
-        <mc:Choice xmlns:a14="http://schemas.microsoft.com/office/drawing/2010/main" Requires="a14">
+      <mc:AlternateContent xmlns:mc="http://schemas.openxmlformats.org/markup-compatibility/2006" xmlns:a14="http://schemas.microsoft.com/office/drawing/2010/main">
+        <mc:Choice Requires="a14">
           <p:sp>
             <p:nvSpPr>
               <p:cNvPr id="4" name="Content Placeholder 3">
@@ -9182,7 +9182,7 @@
             </p:txBody>
           </p:sp>
         </mc:Choice>
-        <mc:Fallback>
+        <mc:Fallback xmlns="">
           <p:sp>
             <p:nvSpPr>
               <p:cNvPr id="4" name="Content Placeholder 3">

</xml_diff>